<commit_message>
section 1,2,5 revised & section 4 added
</commit_message>
<xml_diff>
--- a/figure/getpc.pptx
+++ b/figure/getpc.pptx
@@ -7,6 +7,7 @@
   <p:sldIdLst>
     <p:sldId id="257" r:id="rId2"/>
     <p:sldId id="256" r:id="rId3"/>
+    <p:sldId id="258" r:id="rId4"/>
   </p:sldIdLst>
   <p:sldSz cx="12192000" cy="6858000"/>
   <p:notesSz cx="6858000" cy="9144000"/>
@@ -244,7 +245,7 @@
           <a:p>
             <a:fld id="{F9EE8C27-079C-4D47-A0E8-C266D832816E}" type="datetimeFigureOut">
               <a:rPr lang="ko-KR" altLang="en-US" smtClean="0"/>
-              <a:t>2018-03-12</a:t>
+              <a:t>2018-03-13</a:t>
             </a:fld>
             <a:endParaRPr lang="ko-KR" altLang="en-US"/>
           </a:p>
@@ -414,7 +415,7 @@
           <a:p>
             <a:fld id="{F9EE8C27-079C-4D47-A0E8-C266D832816E}" type="datetimeFigureOut">
               <a:rPr lang="ko-KR" altLang="en-US" smtClean="0"/>
-              <a:t>2018-03-12</a:t>
+              <a:t>2018-03-13</a:t>
             </a:fld>
             <a:endParaRPr lang="ko-KR" altLang="en-US"/>
           </a:p>
@@ -594,7 +595,7 @@
           <a:p>
             <a:fld id="{F9EE8C27-079C-4D47-A0E8-C266D832816E}" type="datetimeFigureOut">
               <a:rPr lang="ko-KR" altLang="en-US" smtClean="0"/>
-              <a:t>2018-03-12</a:t>
+              <a:t>2018-03-13</a:t>
             </a:fld>
             <a:endParaRPr lang="ko-KR" altLang="en-US"/>
           </a:p>
@@ -764,7 +765,7 @@
           <a:p>
             <a:fld id="{F9EE8C27-079C-4D47-A0E8-C266D832816E}" type="datetimeFigureOut">
               <a:rPr lang="ko-KR" altLang="en-US" smtClean="0"/>
-              <a:t>2018-03-12</a:t>
+              <a:t>2018-03-13</a:t>
             </a:fld>
             <a:endParaRPr lang="ko-KR" altLang="en-US"/>
           </a:p>
@@ -1010,7 +1011,7 @@
           <a:p>
             <a:fld id="{F9EE8C27-079C-4D47-A0E8-C266D832816E}" type="datetimeFigureOut">
               <a:rPr lang="ko-KR" altLang="en-US" smtClean="0"/>
-              <a:t>2018-03-12</a:t>
+              <a:t>2018-03-13</a:t>
             </a:fld>
             <a:endParaRPr lang="ko-KR" altLang="en-US"/>
           </a:p>
@@ -1242,7 +1243,7 @@
           <a:p>
             <a:fld id="{F9EE8C27-079C-4D47-A0E8-C266D832816E}" type="datetimeFigureOut">
               <a:rPr lang="ko-KR" altLang="en-US" smtClean="0"/>
-              <a:t>2018-03-12</a:t>
+              <a:t>2018-03-13</a:t>
             </a:fld>
             <a:endParaRPr lang="ko-KR" altLang="en-US"/>
           </a:p>
@@ -1609,7 +1610,7 @@
           <a:p>
             <a:fld id="{F9EE8C27-079C-4D47-A0E8-C266D832816E}" type="datetimeFigureOut">
               <a:rPr lang="ko-KR" altLang="en-US" smtClean="0"/>
-              <a:t>2018-03-12</a:t>
+              <a:t>2018-03-13</a:t>
             </a:fld>
             <a:endParaRPr lang="ko-KR" altLang="en-US"/>
           </a:p>
@@ -1727,7 +1728,7 @@
           <a:p>
             <a:fld id="{F9EE8C27-079C-4D47-A0E8-C266D832816E}" type="datetimeFigureOut">
               <a:rPr lang="ko-KR" altLang="en-US" smtClean="0"/>
-              <a:t>2018-03-12</a:t>
+              <a:t>2018-03-13</a:t>
             </a:fld>
             <a:endParaRPr lang="ko-KR" altLang="en-US"/>
           </a:p>
@@ -1822,7 +1823,7 @@
           <a:p>
             <a:fld id="{F9EE8C27-079C-4D47-A0E8-C266D832816E}" type="datetimeFigureOut">
               <a:rPr lang="ko-KR" altLang="en-US" smtClean="0"/>
-              <a:t>2018-03-12</a:t>
+              <a:t>2018-03-13</a:t>
             </a:fld>
             <a:endParaRPr lang="ko-KR" altLang="en-US"/>
           </a:p>
@@ -2099,7 +2100,7 @@
           <a:p>
             <a:fld id="{F9EE8C27-079C-4D47-A0E8-C266D832816E}" type="datetimeFigureOut">
               <a:rPr lang="ko-KR" altLang="en-US" smtClean="0"/>
-              <a:t>2018-03-12</a:t>
+              <a:t>2018-03-13</a:t>
             </a:fld>
             <a:endParaRPr lang="ko-KR" altLang="en-US"/>
           </a:p>
@@ -2352,7 +2353,7 @@
           <a:p>
             <a:fld id="{F9EE8C27-079C-4D47-A0E8-C266D832816E}" type="datetimeFigureOut">
               <a:rPr lang="ko-KR" altLang="en-US" smtClean="0"/>
-              <a:t>2018-03-12</a:t>
+              <a:t>2018-03-13</a:t>
             </a:fld>
             <a:endParaRPr lang="ko-KR" altLang="en-US"/>
           </a:p>
@@ -2565,7 +2566,7 @@
           <a:p>
             <a:fld id="{F9EE8C27-079C-4D47-A0E8-C266D832816E}" type="datetimeFigureOut">
               <a:rPr lang="ko-KR" altLang="en-US" smtClean="0"/>
-              <a:t>2018-03-12</a:t>
+              <a:t>2018-03-13</a:t>
             </a:fld>
             <a:endParaRPr lang="ko-KR" altLang="en-US"/>
           </a:p>
@@ -2979,13 +2980,13 @@
           <p:nvPr>
             <p:extLst>
               <p:ext uri="{D42A27DB-BD31-4B8C-83A1-F6EECF244321}">
-                <p14:modId xmlns:p14="http://schemas.microsoft.com/office/powerpoint/2010/main" val="4221474340"/>
+                <p14:modId xmlns:p14="http://schemas.microsoft.com/office/powerpoint/2010/main" val="891819974"/>
               </p:ext>
             </p:extLst>
           </p:nvPr>
         </p:nvGraphicFramePr>
         <p:xfrm>
-          <a:off x="4147307" y="2966876"/>
+          <a:off x="7306865" y="4253462"/>
           <a:ext cx="1975505" cy="2252580"/>
         </p:xfrm>
         <a:graphic>
@@ -3059,14 +3060,28 @@
                           <a:latin typeface="Times New Roman" panose="02020603050405020304" pitchFamily="18" charset="0"/>
                           <a:cs typeface="Times New Roman" panose="02020603050405020304" pitchFamily="18" charset="0"/>
                         </a:rPr>
-                        <a:t>Write…Table()</a:t>
+                        <a:t>Write…Table</a:t>
+                      </a:r>
+                      <a:r>
+                        <a:rPr lang="en-US" altLang="ko-KR" sz="1400" b="1" dirty="0" smtClean="0">
+                          <a:latin typeface="Times New Roman" panose="02020603050405020304" pitchFamily="18" charset="0"/>
+                          <a:cs typeface="Times New Roman" panose="02020603050405020304" pitchFamily="18" charset="0"/>
+                        </a:rPr>
+                        <a:t>( )</a:t>
                       </a:r>
                       <a:r>
                         <a:rPr lang="en-US" altLang="ko-KR" sz="1400" dirty="0" smtClean="0">
                           <a:latin typeface="Times New Roman" panose="02020603050405020304" pitchFamily="18" charset="0"/>
                           <a:cs typeface="Times New Roman" panose="02020603050405020304" pitchFamily="18" charset="0"/>
                         </a:rPr>
-                        <a:t>]+4</a:t>
+                        <a:t>]+</a:t>
+                      </a:r>
+                      <a:r>
+                        <a:rPr lang="en-US" altLang="ko-KR" sz="1400" dirty="0" smtClean="0">
+                          <a:latin typeface="Times New Roman" panose="02020603050405020304" pitchFamily="18" charset="0"/>
+                          <a:cs typeface="Times New Roman" panose="02020603050405020304" pitchFamily="18" charset="0"/>
+                        </a:rPr>
+                        <a:t>4</a:t>
                       </a:r>
                       <a:endParaRPr lang="ko-KR" altLang="en-US" sz="1400" dirty="0" smtClean="0">
                         <a:latin typeface="Times New Roman" panose="02020603050405020304" pitchFamily="18" charset="0"/>
@@ -3209,14 +3224,21 @@
                           <a:latin typeface="Times New Roman" panose="02020603050405020304" pitchFamily="18" charset="0"/>
                           <a:cs typeface="Times New Roman" panose="02020603050405020304" pitchFamily="18" charset="0"/>
                         </a:rPr>
-                        <a:t>()</a:t>
+                        <a:t>( )</a:t>
                       </a:r>
                       <a:r>
                         <a:rPr lang="en-US" altLang="ko-KR" sz="1400" dirty="0" smtClean="0">
                           <a:latin typeface="Times New Roman" panose="02020603050405020304" pitchFamily="18" charset="0"/>
                           <a:cs typeface="Times New Roman" panose="02020603050405020304" pitchFamily="18" charset="0"/>
                         </a:rPr>
-                        <a:t>]+4</a:t>
+                        <a:t>]+</a:t>
+                      </a:r>
+                      <a:r>
+                        <a:rPr lang="en-US" altLang="ko-KR" sz="1400" dirty="0" smtClean="0">
+                          <a:latin typeface="Times New Roman" panose="02020603050405020304" pitchFamily="18" charset="0"/>
+                          <a:cs typeface="Times New Roman" panose="02020603050405020304" pitchFamily="18" charset="0"/>
+                        </a:rPr>
+                        <a:t>4</a:t>
                       </a:r>
                       <a:endParaRPr lang="ko-KR" altLang="en-US" sz="1400" dirty="0" smtClean="0">
                         <a:latin typeface="Times New Roman" panose="02020603050405020304" pitchFamily="18" charset="0"/>
@@ -3352,14 +3374,28 @@
                           <a:latin typeface="Times New Roman" panose="02020603050405020304" pitchFamily="18" charset="0"/>
                           <a:cs typeface="Times New Roman" panose="02020603050405020304" pitchFamily="18" charset="0"/>
                         </a:rPr>
-                        <a:t>write()</a:t>
+                        <a:t>write</a:t>
+                      </a:r>
+                      <a:r>
+                        <a:rPr lang="en-US" altLang="ko-KR" sz="1400" b="1" dirty="0" smtClean="0">
+                          <a:latin typeface="Times New Roman" panose="02020603050405020304" pitchFamily="18" charset="0"/>
+                          <a:cs typeface="Times New Roman" panose="02020603050405020304" pitchFamily="18" charset="0"/>
+                        </a:rPr>
+                        <a:t>( )</a:t>
                       </a:r>
                       <a:r>
                         <a:rPr lang="en-US" altLang="ko-KR" sz="1400" dirty="0" smtClean="0">
                           <a:latin typeface="Times New Roman" panose="02020603050405020304" pitchFamily="18" charset="0"/>
                           <a:cs typeface="Times New Roman" panose="02020603050405020304" pitchFamily="18" charset="0"/>
                         </a:rPr>
-                        <a:t>]+4</a:t>
+                        <a:t>]+</a:t>
+                      </a:r>
+                      <a:r>
+                        <a:rPr lang="en-US" altLang="ko-KR" sz="1400" dirty="0" smtClean="0">
+                          <a:latin typeface="Times New Roman" panose="02020603050405020304" pitchFamily="18" charset="0"/>
+                          <a:cs typeface="Times New Roman" panose="02020603050405020304" pitchFamily="18" charset="0"/>
+                        </a:rPr>
+                        <a:t>4</a:t>
                       </a:r>
                       <a:endParaRPr lang="ko-KR" altLang="en-US" sz="1400" dirty="0" smtClean="0">
                         <a:latin typeface="Times New Roman" panose="02020603050405020304" pitchFamily="18" charset="0"/>
@@ -3449,7 +3485,7 @@
         </p:nvSpPr>
         <p:spPr>
           <a:xfrm>
-            <a:off x="4254850" y="2643897"/>
+            <a:off x="7435674" y="3930483"/>
             <a:ext cx="1760418" cy="338554"/>
           </a:xfrm>
           <a:prstGeom prst="rect">
@@ -3487,14 +3523,14 @@
           <p:nvPr>
             <p:extLst>
               <p:ext uri="{D42A27DB-BD31-4B8C-83A1-F6EECF244321}">
-                <p14:modId xmlns:p14="http://schemas.microsoft.com/office/powerpoint/2010/main" val="2920882600"/>
+                <p14:modId xmlns:p14="http://schemas.microsoft.com/office/powerpoint/2010/main" val="280674397"/>
               </p:ext>
             </p:extLst>
           </p:nvPr>
         </p:nvGraphicFramePr>
         <p:xfrm>
-          <a:off x="7001292" y="2966876"/>
-          <a:ext cx="1941044" cy="2252580"/>
+          <a:off x="6894964" y="1577372"/>
+          <a:ext cx="1976400" cy="2252580"/>
         </p:xfrm>
         <a:graphic>
           <a:graphicData uri="http://schemas.openxmlformats.org/drawingml/2006/table">
@@ -3503,7 +3539,7 @@
                 <a:tableStyleId>{5940675A-B579-460E-94D1-54222C63F5DA}</a:tableStyleId>
               </a:tblPr>
               <a:tblGrid>
-                <a:gridCol w="1941044">
+                <a:gridCol w="1976400">
                   <a:extLst>
                     <a:ext uri="{9D8B030D-6E8A-4147-A177-3AD203B41FA5}">
                       <a16:colId xmlns:a16="http://schemas.microsoft.com/office/drawing/2014/main" val="4253861789"/>
@@ -3606,14 +3642,28 @@
                           <a:latin typeface="Times New Roman" panose="02020603050405020304" pitchFamily="18" charset="0"/>
                           <a:cs typeface="Times New Roman" panose="02020603050405020304" pitchFamily="18" charset="0"/>
                         </a:rPr>
-                        <a:t>Write…Table()</a:t>
+                        <a:t>Write…Table</a:t>
+                      </a:r>
+                      <a:r>
+                        <a:rPr lang="en-US" altLang="ko-KR" sz="1400" b="1" dirty="0" smtClean="0">
+                          <a:latin typeface="Times New Roman" panose="02020603050405020304" pitchFamily="18" charset="0"/>
+                          <a:cs typeface="Times New Roman" panose="02020603050405020304" pitchFamily="18" charset="0"/>
+                        </a:rPr>
+                        <a:t>( )</a:t>
                       </a:r>
                       <a:r>
                         <a:rPr lang="en-US" altLang="ko-KR" sz="1400" dirty="0" smtClean="0">
                           <a:latin typeface="Times New Roman" panose="02020603050405020304" pitchFamily="18" charset="0"/>
                           <a:cs typeface="Times New Roman" panose="02020603050405020304" pitchFamily="18" charset="0"/>
                         </a:rPr>
-                        <a:t>]+4</a:t>
+                        <a:t>]+</a:t>
+                      </a:r>
+                      <a:r>
+                        <a:rPr lang="en-US" altLang="ko-KR" sz="1400" dirty="0" smtClean="0">
+                          <a:latin typeface="Times New Roman" panose="02020603050405020304" pitchFamily="18" charset="0"/>
+                          <a:cs typeface="Times New Roman" panose="02020603050405020304" pitchFamily="18" charset="0"/>
+                        </a:rPr>
+                        <a:t>4</a:t>
                       </a:r>
                       <a:endParaRPr lang="ko-KR" altLang="en-US" sz="1400" dirty="0" smtClean="0">
                         <a:latin typeface="Times New Roman" panose="02020603050405020304" pitchFamily="18" charset="0"/>
@@ -3801,14 +3851,21 @@
                           <a:latin typeface="Times New Roman" panose="02020603050405020304" pitchFamily="18" charset="0"/>
                           <a:cs typeface="Times New Roman" panose="02020603050405020304" pitchFamily="18" charset="0"/>
                         </a:rPr>
-                        <a:t>()</a:t>
+                        <a:t>( )</a:t>
                       </a:r>
                       <a:r>
                         <a:rPr lang="en-US" altLang="ko-KR" sz="1400" dirty="0" smtClean="0">
                           <a:latin typeface="Times New Roman" panose="02020603050405020304" pitchFamily="18" charset="0"/>
                           <a:cs typeface="Times New Roman" panose="02020603050405020304" pitchFamily="18" charset="0"/>
                         </a:rPr>
-                        <a:t>]+4</a:t>
+                        <a:t>]+</a:t>
+                      </a:r>
+                      <a:r>
+                        <a:rPr lang="en-US" altLang="ko-KR" sz="1400" dirty="0" smtClean="0">
+                          <a:latin typeface="Times New Roman" panose="02020603050405020304" pitchFamily="18" charset="0"/>
+                          <a:cs typeface="Times New Roman" panose="02020603050405020304" pitchFamily="18" charset="0"/>
+                        </a:rPr>
+                        <a:t>4</a:t>
                       </a:r>
                       <a:endParaRPr lang="ko-KR" altLang="en-US" sz="1400" dirty="0" smtClean="0">
                         <a:latin typeface="Times New Roman" panose="02020603050405020304" pitchFamily="18" charset="0"/>
@@ -3897,14 +3954,28 @@
                           <a:latin typeface="Times New Roman" panose="02020603050405020304" pitchFamily="18" charset="0"/>
                           <a:cs typeface="Times New Roman" panose="02020603050405020304" pitchFamily="18" charset="0"/>
                         </a:rPr>
-                        <a:t>write()</a:t>
+                        <a:t>write</a:t>
+                      </a:r>
+                      <a:r>
+                        <a:rPr lang="en-US" altLang="ko-KR" sz="1400" b="1" dirty="0" smtClean="0">
+                          <a:latin typeface="Times New Roman" panose="02020603050405020304" pitchFamily="18" charset="0"/>
+                          <a:cs typeface="Times New Roman" panose="02020603050405020304" pitchFamily="18" charset="0"/>
+                        </a:rPr>
+                        <a:t>( )</a:t>
                       </a:r>
                       <a:r>
                         <a:rPr lang="en-US" altLang="ko-KR" sz="1400" dirty="0" smtClean="0">
                           <a:latin typeface="Times New Roman" panose="02020603050405020304" pitchFamily="18" charset="0"/>
                           <a:cs typeface="Times New Roman" panose="02020603050405020304" pitchFamily="18" charset="0"/>
                         </a:rPr>
-                        <a:t>]+4</a:t>
+                        <a:t>]+</a:t>
+                      </a:r>
+                      <a:r>
+                        <a:rPr lang="en-US" altLang="ko-KR" sz="1400" dirty="0" smtClean="0">
+                          <a:latin typeface="Times New Roman" panose="02020603050405020304" pitchFamily="18" charset="0"/>
+                          <a:cs typeface="Times New Roman" panose="02020603050405020304" pitchFamily="18" charset="0"/>
+                        </a:rPr>
+                        <a:t>4</a:t>
                       </a:r>
                       <a:endParaRPr lang="ko-KR" altLang="en-US" sz="1400" dirty="0" smtClean="0">
                         <a:latin typeface="Times New Roman" panose="02020603050405020304" pitchFamily="18" charset="0"/>
@@ -3959,7 +4030,7 @@
         </p:nvSpPr>
         <p:spPr>
           <a:xfrm>
-            <a:off x="7095765" y="2643897"/>
+            <a:off x="7031969" y="1254393"/>
             <a:ext cx="1760418" cy="338554"/>
           </a:xfrm>
           <a:prstGeom prst="rect">
@@ -3996,7 +4067,7 @@
         </p:nvSpPr>
         <p:spPr>
           <a:xfrm>
-            <a:off x="6817709" y="3263027"/>
+            <a:off x="6753913" y="1873523"/>
             <a:ext cx="156850" cy="1747358"/>
           </a:xfrm>
           <a:prstGeom prst="upArrow">
@@ -4043,13 +4114,13 @@
           <p:nvPr>
             <p:extLst>
               <p:ext uri="{D42A27DB-BD31-4B8C-83A1-F6EECF244321}">
-                <p14:modId xmlns:p14="http://schemas.microsoft.com/office/powerpoint/2010/main" val="942668960"/>
+                <p14:modId xmlns:p14="http://schemas.microsoft.com/office/powerpoint/2010/main" val="1548611699"/>
               </p:ext>
             </p:extLst>
           </p:nvPr>
         </p:nvGraphicFramePr>
         <p:xfrm>
-          <a:off x="9135824" y="3143720"/>
+          <a:off x="9072028" y="1754216"/>
           <a:ext cx="1048434" cy="1802488"/>
         </p:xfrm>
         <a:graphic>
@@ -4273,7 +4344,7 @@
         </p:nvSpPr>
         <p:spPr>
           <a:xfrm>
-            <a:off x="9021808" y="2684676"/>
+            <a:off x="8958012" y="1295172"/>
             <a:ext cx="1153738" cy="461665"/>
           </a:xfrm>
           <a:prstGeom prst="rect">
@@ -4334,7 +4405,7 @@
         </p:nvCxnSpPr>
         <p:spPr>
           <a:xfrm>
-            <a:off x="8951768" y="4861384"/>
+            <a:off x="8887972" y="3471880"/>
             <a:ext cx="203475" cy="1150"/>
           </a:xfrm>
           <a:prstGeom prst="straightConnector1">
@@ -4370,7 +4441,7 @@
         </p:nvCxnSpPr>
         <p:spPr>
           <a:xfrm>
-            <a:off x="8934433" y="4473390"/>
+            <a:off x="8870637" y="3083886"/>
             <a:ext cx="201391" cy="298656"/>
           </a:xfrm>
           <a:prstGeom prst="straightConnector1">
@@ -4406,7 +4477,7 @@
         </p:nvCxnSpPr>
         <p:spPr>
           <a:xfrm>
-            <a:off x="8934433" y="3520120"/>
+            <a:off x="8870637" y="2130616"/>
             <a:ext cx="187472" cy="1094764"/>
           </a:xfrm>
           <a:prstGeom prst="straightConnector1">
@@ -4442,8 +4513,8 @@
         </p:nvSpPr>
         <p:spPr>
           <a:xfrm rot="10800000">
-            <a:off x="6106923" y="4091321"/>
-            <a:ext cx="351238" cy="839597"/>
+            <a:off x="9266481" y="5465180"/>
+            <a:ext cx="351238" cy="752323"/>
           </a:xfrm>
           <a:prstGeom prst="curvedRightArrow">
             <a:avLst/>
@@ -4489,7 +4560,7 @@
         </p:nvSpPr>
         <p:spPr>
           <a:xfrm rot="10800000">
-            <a:off x="6106923" y="3343398"/>
+            <a:off x="9266481" y="4736314"/>
             <a:ext cx="351238" cy="767067"/>
           </a:xfrm>
           <a:prstGeom prst="curvedRightArrow">
@@ -4536,16 +4607,21 @@
         </p:nvSpPr>
         <p:spPr>
           <a:xfrm>
-            <a:off x="4082913" y="1502157"/>
-            <a:ext cx="1270989" cy="518091"/>
+            <a:off x="2359380" y="525266"/>
+            <a:ext cx="1136530" cy="246221"/>
           </a:xfrm>
           <a:prstGeom prst="rect">
             <a:avLst/>
           </a:prstGeom>
           <a:noFill/>
+          <a:ln>
+            <a:solidFill>
+              <a:schemeClr val="bg1"/>
+            </a:solidFill>
+          </a:ln>
         </p:spPr>
         <p:txBody>
-          <a:bodyPr wrap="none" rtlCol="0">
+          <a:bodyPr wrap="none" lIns="0" tIns="0" rIns="0" bIns="0" rtlCol="0">
             <a:spAutoFit/>
           </a:bodyPr>
           <a:lstStyle/>
@@ -4556,21 +4632,7 @@
                 <a:latin typeface="Times New Roman" panose="02020603050405020304" pitchFamily="18" charset="0"/>
                 <a:cs typeface="Times New Roman" panose="02020603050405020304" pitchFamily="18" charset="0"/>
               </a:rPr>
-              <a:t>Flush Thread</a:t>
-            </a:r>
-          </a:p>
-          <a:p>
-            <a:pPr algn="ctr">
-              <a:lnSpc>
-                <a:spcPts val="1400"/>
-              </a:lnSpc>
-            </a:pPr>
-            <a:r>
-              <a:rPr lang="en-US" altLang="ko-KR" sz="1600" dirty="0" smtClean="0">
-                <a:latin typeface="Times New Roman" panose="02020603050405020304" pitchFamily="18" charset="0"/>
-                <a:cs typeface="Times New Roman" panose="02020603050405020304" pitchFamily="18" charset="0"/>
-              </a:rPr>
-              <a:t>Write Path</a:t>
+              <a:t>Flushing Path</a:t>
             </a:r>
             <a:endParaRPr lang="ko-KR" altLang="en-US" sz="1600" dirty="0">
               <a:latin typeface="Times New Roman" panose="02020603050405020304" pitchFamily="18" charset="0"/>
@@ -4589,9 +4651,9 @@
           <p:nvPr/>
         </p:nvCxnSpPr>
         <p:spPr>
-          <a:xfrm>
-            <a:off x="5861401" y="1788729"/>
-            <a:ext cx="261411" cy="0"/>
+          <a:xfrm flipV="1">
+            <a:off x="4103072" y="653866"/>
+            <a:ext cx="254735" cy="1"/>
           </a:xfrm>
           <a:prstGeom prst="straightConnector1">
             <a:avLst/>
@@ -4626,8 +4688,8 @@
         </p:nvSpPr>
         <p:spPr>
           <a:xfrm>
-            <a:off x="5420783" y="1633929"/>
-            <a:ext cx="440618" cy="309600"/>
+            <a:off x="3649103" y="506194"/>
+            <a:ext cx="453969" cy="295345"/>
           </a:xfrm>
           <a:prstGeom prst="rect">
             <a:avLst/>
@@ -4645,7 +4707,14 @@
                 <a:latin typeface="Times New Roman" panose="02020603050405020304" pitchFamily="18" charset="0"/>
                 <a:cs typeface="Times New Roman" panose="02020603050405020304" pitchFamily="18" charset="0"/>
               </a:rPr>
-              <a:t>Run()</a:t>
+              <a:t>Run</a:t>
+            </a:r>
+            <a:r>
+              <a:rPr lang="en-US" altLang="ko-KR" sz="1400" dirty="0" smtClean="0">
+                <a:latin typeface="Times New Roman" panose="02020603050405020304" pitchFamily="18" charset="0"/>
+                <a:cs typeface="Times New Roman" panose="02020603050405020304" pitchFamily="18" charset="0"/>
+              </a:rPr>
+              <a:t>( )</a:t>
             </a:r>
             <a:endParaRPr lang="ko-KR" altLang="en-US" sz="1400" dirty="0">
               <a:latin typeface="Times New Roman" panose="02020603050405020304" pitchFamily="18" charset="0"/>
@@ -4662,8 +4731,8 @@
         </p:nvSpPr>
         <p:spPr>
           <a:xfrm>
-            <a:off x="6122812" y="1634840"/>
-            <a:ext cx="1414939" cy="307777"/>
+            <a:off x="4357807" y="499977"/>
+            <a:ext cx="1459823" cy="307777"/>
           </a:xfrm>
           <a:prstGeom prst="rect">
             <a:avLst/>
@@ -4688,7 +4757,7 @@
                 <a:latin typeface="Times New Roman" panose="02020603050405020304" pitchFamily="18" charset="0"/>
                 <a:cs typeface="Times New Roman" panose="02020603050405020304" pitchFamily="18" charset="0"/>
               </a:rPr>
-              <a:t>()</a:t>
+              <a:t>( )</a:t>
             </a:r>
             <a:endParaRPr lang="ko-KR" altLang="en-US" sz="1400" dirty="0">
               <a:latin typeface="Times New Roman" panose="02020603050405020304" pitchFamily="18" charset="0"/>
@@ -4705,8 +4774,8 @@
         </p:nvSpPr>
         <p:spPr>
           <a:xfrm>
-            <a:off x="7903219" y="1634840"/>
-            <a:ext cx="913968" cy="307777"/>
+            <a:off x="6138214" y="499977"/>
+            <a:ext cx="958852" cy="307777"/>
           </a:xfrm>
           <a:prstGeom prst="rect">
             <a:avLst/>
@@ -4731,7 +4800,7 @@
                 <a:latin typeface="Times New Roman" panose="02020603050405020304" pitchFamily="18" charset="0"/>
                 <a:cs typeface="Times New Roman" panose="02020603050405020304" pitchFamily="18" charset="0"/>
               </a:rPr>
-              <a:t>()</a:t>
+              <a:t>( )</a:t>
             </a:r>
             <a:endParaRPr lang="ko-KR" altLang="en-US" sz="1400" dirty="0">
               <a:latin typeface="Times New Roman" panose="02020603050405020304" pitchFamily="18" charset="0"/>
@@ -4748,8 +4817,8 @@
         </p:nvSpPr>
         <p:spPr>
           <a:xfrm>
-            <a:off x="9263264" y="1634841"/>
-            <a:ext cx="564193" cy="307777"/>
+            <a:off x="7498259" y="499978"/>
+            <a:ext cx="609077" cy="307777"/>
           </a:xfrm>
           <a:prstGeom prst="rect">
             <a:avLst/>
@@ -4767,7 +4836,14 @@
                 <a:latin typeface="Times New Roman" panose="02020603050405020304" pitchFamily="18" charset="0"/>
                 <a:cs typeface="Times New Roman" panose="02020603050405020304" pitchFamily="18" charset="0"/>
               </a:rPr>
-              <a:t>Write()</a:t>
+              <a:t>Write</a:t>
+            </a:r>
+            <a:r>
+              <a:rPr lang="en-US" altLang="ko-KR" sz="1400" b="1" dirty="0" smtClean="0">
+                <a:latin typeface="Times New Roman" panose="02020603050405020304" pitchFamily="18" charset="0"/>
+                <a:cs typeface="Times New Roman" panose="02020603050405020304" pitchFamily="18" charset="0"/>
+              </a:rPr>
+              <a:t>( )</a:t>
             </a:r>
             <a:endParaRPr lang="ko-KR" altLang="en-US" sz="1400" b="1" dirty="0">
               <a:latin typeface="Times New Roman" panose="02020603050405020304" pitchFamily="18" charset="0"/>
@@ -4784,7 +4860,7 @@
         </p:nvSpPr>
         <p:spPr>
           <a:xfrm>
-            <a:off x="5321584" y="1526959"/>
+            <a:off x="3556579" y="392096"/>
             <a:ext cx="4736816" cy="493290"/>
           </a:xfrm>
           <a:prstGeom prst="rect">
@@ -4814,7 +4890,7 @@
           </a:fontRef>
         </p:style>
         <p:txBody>
-          <a:bodyPr rtlCol="0" anchor="ctr"/>
+          <a:bodyPr wrap="none" rtlCol="0" anchor="ctr"/>
           <a:lstStyle/>
           <a:p>
             <a:pPr algn="ctr"/>
@@ -4833,8 +4909,8 @@
         </p:nvCxnSpPr>
         <p:spPr>
           <a:xfrm>
-            <a:off x="7537751" y="1788729"/>
-            <a:ext cx="365468" cy="0"/>
+            <a:off x="5817630" y="653866"/>
+            <a:ext cx="320584" cy="0"/>
           </a:xfrm>
           <a:prstGeom prst="straightConnector1">
             <a:avLst/>
@@ -4872,8 +4948,8 @@
         </p:nvCxnSpPr>
         <p:spPr>
           <a:xfrm>
-            <a:off x="8817187" y="1788729"/>
-            <a:ext cx="446077" cy="1"/>
+            <a:off x="7097066" y="653866"/>
+            <a:ext cx="401193" cy="1"/>
           </a:xfrm>
           <a:prstGeom prst="straightConnector1">
             <a:avLst/>
@@ -4900,6 +4976,94 @@
           </a:fontRef>
         </p:style>
       </p:cxnSp>
+      <p:sp>
+        <p:nvSpPr>
+          <p:cNvPr id="2" name="직사각형 1"/>
+          <p:cNvSpPr/>
+          <p:nvPr/>
+        </p:nvSpPr>
+        <p:spPr>
+          <a:xfrm>
+            <a:off x="6753913" y="4253463"/>
+            <a:ext cx="278056" cy="2252580"/>
+          </a:xfrm>
+          <a:prstGeom prst="rect">
+            <a:avLst/>
+          </a:prstGeom>
+          <a:noFill/>
+          <a:ln>
+            <a:noFill/>
+          </a:ln>
+        </p:spPr>
+        <p:style>
+          <a:lnRef idx="2">
+            <a:schemeClr val="accent1">
+              <a:shade val="50000"/>
+            </a:schemeClr>
+          </a:lnRef>
+          <a:fillRef idx="1">
+            <a:schemeClr val="accent1"/>
+          </a:fillRef>
+          <a:effectRef idx="0">
+            <a:schemeClr val="accent1"/>
+          </a:effectRef>
+          <a:fontRef idx="minor">
+            <a:schemeClr val="lt1"/>
+          </a:fontRef>
+        </p:style>
+        <p:txBody>
+          <a:bodyPr rtlCol="0" anchor="ctr"/>
+          <a:lstStyle/>
+          <a:p>
+            <a:pPr algn="ctr"/>
+            <a:endParaRPr lang="ko-KR" altLang="en-US"/>
+          </a:p>
+        </p:txBody>
+      </p:sp>
+      <p:sp>
+        <p:nvSpPr>
+          <p:cNvPr id="24" name="직사각형 23"/>
+          <p:cNvSpPr/>
+          <p:nvPr/>
+        </p:nvSpPr>
+        <p:spPr>
+          <a:xfrm>
+            <a:off x="9871716" y="4253462"/>
+            <a:ext cx="248746" cy="2252580"/>
+          </a:xfrm>
+          <a:prstGeom prst="rect">
+            <a:avLst/>
+          </a:prstGeom>
+          <a:noFill/>
+          <a:ln>
+            <a:noFill/>
+          </a:ln>
+        </p:spPr>
+        <p:style>
+          <a:lnRef idx="2">
+            <a:schemeClr val="accent1">
+              <a:shade val="50000"/>
+            </a:schemeClr>
+          </a:lnRef>
+          <a:fillRef idx="1">
+            <a:schemeClr val="accent1"/>
+          </a:fillRef>
+          <a:effectRef idx="0">
+            <a:schemeClr val="accent1"/>
+          </a:effectRef>
+          <a:fontRef idx="minor">
+            <a:schemeClr val="lt1"/>
+          </a:fontRef>
+        </p:style>
+        <p:txBody>
+          <a:bodyPr rtlCol="0" anchor="ctr"/>
+          <a:lstStyle/>
+          <a:p>
+            <a:pPr algn="ctr"/>
+            <a:endParaRPr lang="ko-KR" altLang="en-US"/>
+          </a:p>
+        </p:txBody>
+      </p:sp>
     </p:spTree>
     <p:extLst>
       <p:ext uri="{BB962C8B-B14F-4D97-AF65-F5344CB8AC3E}">
@@ -5784,6 +5948,74 @@
     <p:extLst>
       <p:ext uri="{BB962C8B-B14F-4D97-AF65-F5344CB8AC3E}">
         <p14:creationId xmlns:p14="http://schemas.microsoft.com/office/powerpoint/2010/main" val="3858265082"/>
+      </p:ext>
+    </p:extLst>
+  </p:cSld>
+  <p:clrMapOvr>
+    <a:masterClrMapping/>
+  </p:clrMapOvr>
+</p:sld>
+</file>
+
+<file path=ppt/slides/slide3.xml><?xml version="1.0" encoding="utf-8"?>
+<p:sld xmlns:a="http://schemas.openxmlformats.org/drawingml/2006/main" xmlns:r="http://schemas.openxmlformats.org/officeDocument/2006/relationships" xmlns:p="http://schemas.openxmlformats.org/presentationml/2006/main">
+  <p:cSld>
+    <p:spTree>
+      <p:nvGrpSpPr>
+        <p:cNvPr id="1" name=""/>
+        <p:cNvGrpSpPr/>
+        <p:nvPr/>
+      </p:nvGrpSpPr>
+      <p:grpSpPr>
+        <a:xfrm>
+          <a:off x="0" y="0"/>
+          <a:ext cx="0" cy="0"/>
+          <a:chOff x="0" y="0"/>
+          <a:chExt cx="0" cy="0"/>
+        </a:xfrm>
+      </p:grpSpPr>
+      <p:sp>
+        <p:nvSpPr>
+          <p:cNvPr id="2" name="제목 1"/>
+          <p:cNvSpPr>
+            <a:spLocks noGrp="1"/>
+          </p:cNvSpPr>
+          <p:nvPr>
+            <p:ph type="title"/>
+          </p:nvPr>
+        </p:nvSpPr>
+        <p:spPr/>
+        <p:txBody>
+          <a:bodyPr/>
+          <a:lstStyle/>
+          <a:p>
+            <a:endParaRPr lang="ko-KR" altLang="en-US"/>
+          </a:p>
+        </p:txBody>
+      </p:sp>
+      <p:sp>
+        <p:nvSpPr>
+          <p:cNvPr id="3" name="내용 개체 틀 2"/>
+          <p:cNvSpPr>
+            <a:spLocks noGrp="1"/>
+          </p:cNvSpPr>
+          <p:nvPr>
+            <p:ph idx="1"/>
+          </p:nvPr>
+        </p:nvSpPr>
+        <p:spPr/>
+        <p:txBody>
+          <a:bodyPr/>
+          <a:lstStyle/>
+          <a:p>
+            <a:endParaRPr lang="ko-KR" altLang="en-US"/>
+          </a:p>
+        </p:txBody>
+      </p:sp>
+    </p:spTree>
+    <p:extLst>
+      <p:ext uri="{BB962C8B-B14F-4D97-AF65-F5344CB8AC3E}">
+        <p14:creationId xmlns:p14="http://schemas.microsoft.com/office/powerpoint/2010/main" val="3903302972"/>
       </p:ext>
     </p:extLst>
   </p:cSld>

</xml_diff>